<commit_message>
work on new mm2 labs
</commit_message>
<xml_diff>
--- a/docs/mm2-diagrams.pptx
+++ b/docs/mm2-diagrams.pptx
@@ -235,7 +235,7 @@
           <a:p>
             <a:fld id="{43B1B1F9-D0CB-FF4D-BEE0-BED1F1FDA196}" type="datetimeFigureOut">
               <a:rPr lang="en-US" smtClean="0"/>
-              <a:t>4/29/20</a:t>
+              <a:t>5/15/20</a:t>
             </a:fld>
             <a:endParaRPr lang="en-US"/>
           </a:p>
@@ -400,7 +400,7 @@
           <a:p>
             <a:fld id="{26BE012A-D992-5D42-B86E-AA2BC0764EE1}" type="datetimeFigureOut">
               <a:rPr lang="en-US" smtClean="0"/>
-              <a:t>4/29/20</a:t>
+              <a:t>5/15/20</a:t>
             </a:fld>
             <a:endParaRPr lang="en-US"/>
           </a:p>
@@ -3442,14 +3442,14 @@
           </a:ln>
           <a:extLst>
             <a:ext uri="{909E8E84-426E-40dd-AFC4-6F175D3DCCD1}">
-              <a14:hiddenFill xmlns="" xmlns:a14="http://schemas.microsoft.com/office/drawing/2010/main">
+              <a14:hiddenFill xmlns:a14="http://schemas.microsoft.com/office/drawing/2010/main" xmlns="">
                 <a:solidFill>
                   <a:srgbClr val="FFFFFF"/>
                 </a:solidFill>
               </a14:hiddenFill>
             </a:ext>
             <a:ext uri="{91240B29-F687-4f45-9708-019B960494DF}">
-              <a14:hiddenLine xmlns="" xmlns:a14="http://schemas.microsoft.com/office/drawing/2010/main" w="9525">
+              <a14:hiddenLine xmlns:a14="http://schemas.microsoft.com/office/drawing/2010/main" xmlns="" w="9525">
                 <a:solidFill>
                   <a:srgbClr val="000000"/>
                 </a:solidFill>
@@ -3501,14 +3501,14 @@
           <a:effectLst/>
           <a:extLst>
             <a:ext uri="{909E8E84-426E-40dd-AFC4-6F175D3DCCD1}">
-              <a14:hiddenFill xmlns="" xmlns:a14="http://schemas.microsoft.com/office/drawing/2010/main">
+              <a14:hiddenFill xmlns:a14="http://schemas.microsoft.com/office/drawing/2010/main" xmlns="">
                 <a:solidFill>
                   <a:schemeClr val="accent1"/>
                 </a:solidFill>
               </a14:hiddenFill>
             </a:ext>
             <a:ext uri="{91240B29-F687-4f45-9708-019B960494DF}">
-              <a14:hiddenLine xmlns="" xmlns:a14="http://schemas.microsoft.com/office/drawing/2010/main" w="9525">
+              <a14:hiddenLine xmlns:a14="http://schemas.microsoft.com/office/drawing/2010/main" xmlns="" w="9525">
                 <a:solidFill>
                   <a:schemeClr val="tx1"/>
                 </a:solidFill>
@@ -3518,7 +3518,7 @@
               </a14:hiddenLine>
             </a:ext>
             <a:ext uri="{AF507438-7753-43e0-B8FC-AC1667EBCBE1}">
-              <a14:hiddenEffects xmlns="" xmlns:a14="http://schemas.microsoft.com/office/drawing/2010/main">
+              <a14:hiddenEffects xmlns:a14="http://schemas.microsoft.com/office/drawing/2010/main" xmlns="">
                 <a:effectLst>
                   <a:outerShdw blurRad="63500" dist="38099" dir="2700000" algn="ctr" rotWithShape="0">
                     <a:schemeClr val="bg2">
@@ -4234,10 +4234,10 @@
           </a:ln>
           <a:extLst>
             <a:ext uri="{FAA26D3D-D897-4be2-8F04-BA451C77F1D7}">
-              <ma14:placeholderFlag xmlns:ma14="http://schemas.microsoft.com/office/mac/drawingml/2011/main" xmlns="" val="1"/>
+              <ma14:placeholderFlag xmlns="" xmlns:ma14="http://schemas.microsoft.com/office/mac/drawingml/2011/main" val="1"/>
             </a:ext>
             <a:ext uri="{909E8E84-426E-40dd-AFC4-6F175D3DCCD1}">
-              <a14:hiddenFill xmlns:a14="http://schemas.microsoft.com/office/drawing/2010/main" xmlns="">
+              <a14:hiddenFill xmlns="" xmlns:a14="http://schemas.microsoft.com/office/drawing/2010/main">
                 <a:solidFill>
                   <a:srgbClr val="FFFFFF"/>
                 </a:solidFill>
@@ -4288,10 +4288,10 @@
           </a:ln>
           <a:extLst>
             <a:ext uri="{FAA26D3D-D897-4be2-8F04-BA451C77F1D7}">
-              <ma14:placeholderFlag xmlns:ma14="http://schemas.microsoft.com/office/mac/drawingml/2011/main" xmlns="" val="1"/>
+              <ma14:placeholderFlag xmlns="" xmlns:ma14="http://schemas.microsoft.com/office/mac/drawingml/2011/main" val="1"/>
             </a:ext>
             <a:ext uri="{909E8E84-426E-40dd-AFC4-6F175D3DCCD1}">
-              <a14:hiddenFill xmlns:a14="http://schemas.microsoft.com/office/drawing/2010/main" xmlns="">
+              <a14:hiddenFill xmlns="" xmlns:a14="http://schemas.microsoft.com/office/drawing/2010/main">
                 <a:solidFill>
                   <a:srgbClr val="FFFFFF"/>
                 </a:solidFill>
@@ -49154,7 +49154,7 @@
         </p:nvSpPr>
         <p:spPr bwMode="auto">
           <a:xfrm>
-            <a:off x="6645551" y="2551843"/>
+            <a:off x="2120839" y="2647089"/>
             <a:ext cx="1812650" cy="980126"/>
           </a:xfrm>
           <a:prstGeom prst="roundRect">
@@ -49417,7 +49417,7 @@
         </p:nvSpPr>
         <p:spPr>
           <a:xfrm>
-            <a:off x="7130073" y="3016890"/>
+            <a:off x="2571508" y="3147606"/>
             <a:ext cx="994405" cy="292973"/>
           </a:xfrm>
           <a:prstGeom prst="roundRect">
@@ -49585,14 +49585,14 @@
           <p:nvPr/>
         </p:nvCxnSpPr>
         <p:spPr>
-          <a:xfrm rot="16200000" flipH="1">
-            <a:off x="6312394" y="1351293"/>
-            <a:ext cx="1528798" cy="2095370"/>
+          <a:xfrm rot="16200000" flipH="1" flipV="1">
+            <a:off x="3967754" y="1232738"/>
+            <a:ext cx="1659514" cy="2463195"/>
           </a:xfrm>
           <a:prstGeom prst="bentConnector4">
             <a:avLst>
-              <a:gd name="adj1" fmla="val -14953"/>
-              <a:gd name="adj2" fmla="val 130179"/>
+              <a:gd name="adj1" fmla="val -13775"/>
+              <a:gd name="adj2" fmla="val 51402"/>
             </a:avLst>
           </a:prstGeom>
           <a:ln w="12700">
@@ -49636,8 +49636,8 @@
         </p:nvCxnSpPr>
         <p:spPr>
           <a:xfrm rot="10800000">
-            <a:off x="1943107" y="2046571"/>
-            <a:ext cx="5186966" cy="1116807"/>
+            <a:off x="1943108" y="2046571"/>
+            <a:ext cx="628401" cy="1247523"/>
           </a:xfrm>
           <a:prstGeom prst="bentConnector2">
             <a:avLst/>
@@ -49679,7 +49679,7 @@
         </p:nvSpPr>
         <p:spPr>
           <a:xfrm>
-            <a:off x="7136814" y="2698743"/>
+            <a:off x="2587605" y="2792726"/>
             <a:ext cx="994405" cy="292973"/>
           </a:xfrm>
           <a:prstGeom prst="roundRect">
@@ -50563,13 +50563,15 @@
           <p:nvPr/>
         </p:nvCxnSpPr>
         <p:spPr>
-          <a:xfrm>
-            <a:off x="3657244" y="1833455"/>
-            <a:ext cx="3479570" cy="1011774"/>
-          </a:xfrm>
-          <a:prstGeom prst="bentConnector3">
+          <a:xfrm flipH="1">
+            <a:off x="2587605" y="1833455"/>
+            <a:ext cx="1069640" cy="1105758"/>
+          </a:xfrm>
+          <a:prstGeom prst="bentConnector5">
             <a:avLst>
-              <a:gd name="adj1" fmla="val 24378"/>
+              <a:gd name="adj1" fmla="val -21372"/>
+              <a:gd name="adj2" fmla="val 52679"/>
+              <a:gd name="adj3" fmla="val 121372"/>
             </a:avLst>
           </a:prstGeom>
           <a:ln w="12700">
@@ -50831,12 +50833,12 @@
         </p:nvCxnSpPr>
         <p:spPr>
           <a:xfrm flipV="1">
-            <a:off x="8131219" y="1827611"/>
-            <a:ext cx="199482" cy="1017619"/>
+            <a:off x="3582010" y="1827611"/>
+            <a:ext cx="4748691" cy="1111602"/>
           </a:xfrm>
           <a:prstGeom prst="bentConnector3">
             <a:avLst>
-              <a:gd name="adj1" fmla="val 257385"/>
+              <a:gd name="adj1" fmla="val 104814"/>
             </a:avLst>
           </a:prstGeom>
           <a:ln w="12700">

</xml_diff>